<commit_message>
-Added text to thesis
</commit_message>
<xml_diff>
--- a/Presentatie 1/Masterproef_final.pptx
+++ b/Presentatie 1/Masterproef_final.pptx
@@ -5,7 +5,7 @@
     <p:sldMasterId id="2147483677" r:id="rId1"/>
   </p:sldMasterIdLst>
   <p:notesMasterIdLst>
-    <p:notesMasterId r:id="rId15"/>
+    <p:notesMasterId r:id="rId16"/>
   </p:notesMasterIdLst>
   <p:sldIdLst>
     <p:sldId id="257" r:id="rId2"/>
@@ -20,7 +20,8 @@
     <p:sldId id="267" r:id="rId11"/>
     <p:sldId id="268" r:id="rId12"/>
     <p:sldId id="269" r:id="rId13"/>
-    <p:sldId id="270" r:id="rId14"/>
+    <p:sldId id="271" r:id="rId14"/>
+    <p:sldId id="270" r:id="rId15"/>
   </p:sldIdLst>
   <p:sldSz cx="9144000" cy="6858000" type="screen4x3"/>
   <p:notesSz cx="6858000" cy="9144000"/>
@@ -119,6 +120,11 @@
       </a:defRPr>
     </a:lvl9pPr>
   </p:defaultTextStyle>
+  <p:extLst>
+    <p:ext uri="{EFAFB233-063F-42B5-8137-9DF3F51BA10A}">
+      <p15:sldGuideLst xmlns:p15="http://schemas.microsoft.com/office/powerpoint/2012/main"/>
+    </p:ext>
+  </p:extLst>
 </p:presentation>
 </file>
 
@@ -204,7 +210,7 @@
           <a:p>
             <a:fld id="{F3D4D562-915A-4C21-9EFE-F203DAA557C6}" type="datetimeFigureOut">
               <a:rPr lang="nl-BE" smtClean="0"/>
-              <a:t>5/04/2016</a:t>
+              <a:t>27/04/2016</a:t>
             </a:fld>
             <a:endParaRPr lang="nl-BE"/>
           </a:p>
@@ -842,6 +848,182 @@
 </p:notes>
 </file>
 
+<file path=ppt/notesSlides/notesSlide13.xml><?xml version="1.0" encoding="utf-8"?>
+<p:notes xmlns:a="http://schemas.openxmlformats.org/drawingml/2006/main" xmlns:r="http://schemas.openxmlformats.org/officeDocument/2006/relationships" xmlns:p="http://schemas.openxmlformats.org/presentationml/2006/main">
+  <p:cSld>
+    <p:spTree>
+      <p:nvGrpSpPr>
+        <p:cNvPr id="1" name=""/>
+        <p:cNvGrpSpPr/>
+        <p:nvPr/>
+      </p:nvGrpSpPr>
+      <p:grpSpPr>
+        <a:xfrm>
+          <a:off x="0" y="0"/>
+          <a:ext cx="0" cy="0"/>
+          <a:chOff x="0" y="0"/>
+          <a:chExt cx="0" cy="0"/>
+        </a:xfrm>
+      </p:grpSpPr>
+      <p:sp>
+        <p:nvSpPr>
+          <p:cNvPr id="2" name="Slide Image Placeholder 1"/>
+          <p:cNvSpPr>
+            <a:spLocks noGrp="1" noRot="1" noChangeAspect="1"/>
+          </p:cNvSpPr>
+          <p:nvPr>
+            <p:ph type="sldImg"/>
+          </p:nvPr>
+        </p:nvSpPr>
+        <p:spPr/>
+      </p:sp>
+      <p:sp>
+        <p:nvSpPr>
+          <p:cNvPr id="3" name="Notes Placeholder 2"/>
+          <p:cNvSpPr>
+            <a:spLocks noGrp="1"/>
+          </p:cNvSpPr>
+          <p:nvPr>
+            <p:ph type="body" idx="1"/>
+          </p:nvPr>
+        </p:nvSpPr>
+        <p:spPr/>
+        <p:txBody>
+          <a:bodyPr/>
+          <a:lstStyle/>
+          <a:p>
+            <a:r>
+              <a:rPr lang="nl-BE" dirty="0" smtClean="0"/>
+              <a:t>Dit is een</a:t>
+            </a:r>
+            <a:r>
+              <a:rPr lang="nl-BE" baseline="0" dirty="0" smtClean="0"/>
+              <a:t> screenshot van het programma waarvoor ik de plugin heb geschreven. De grijze balkjes zijn modules die elk een specifieke taak verichten. Deze kunnen naargelang de toepassing met elkaar verbonden worden. In dit voorbeeld lezen de bovenste twee modules streams in van een microcontroller. Deze streams worden doorgestuurd naar een andere module die ervoor zorgt dat ze gesynchroniseerd worden. De onderste module schrijft de gesynchroniseerde streams weg naar een bestand.</a:t>
+            </a:r>
+            <a:endParaRPr lang="nl-BE" dirty="0"/>
+          </a:p>
+        </p:txBody>
+      </p:sp>
+      <p:sp>
+        <p:nvSpPr>
+          <p:cNvPr id="4" name="Slide Number Placeholder 3"/>
+          <p:cNvSpPr>
+            <a:spLocks noGrp="1"/>
+          </p:cNvSpPr>
+          <p:nvPr>
+            <p:ph type="sldNum" sz="quarter" idx="10"/>
+          </p:nvPr>
+        </p:nvSpPr>
+        <p:spPr/>
+        <p:txBody>
+          <a:bodyPr/>
+          <a:lstStyle/>
+          <a:p>
+            <a:fld id="{F1B74BCE-2F86-4025-ABE5-8DEE86D7782F}" type="slidenum">
+              <a:rPr lang="nl-BE" smtClean="0"/>
+              <a:t>13</a:t>
+            </a:fld>
+            <a:endParaRPr lang="nl-BE"/>
+          </a:p>
+        </p:txBody>
+      </p:sp>
+    </p:spTree>
+    <p:extLst>
+      <p:ext uri="{BB962C8B-B14F-4D97-AF65-F5344CB8AC3E}">
+        <p14:creationId xmlns:p14="http://schemas.microsoft.com/office/powerpoint/2010/main" val="838585735"/>
+      </p:ext>
+    </p:extLst>
+  </p:cSld>
+  <p:clrMapOvr>
+    <a:masterClrMapping/>
+  </p:clrMapOvr>
+</p:notes>
+</file>
+
+<file path=ppt/notesSlides/notesSlide14.xml><?xml version="1.0" encoding="utf-8"?>
+<p:notes xmlns:a="http://schemas.openxmlformats.org/drawingml/2006/main" xmlns:r="http://schemas.openxmlformats.org/officeDocument/2006/relationships" xmlns:p="http://schemas.openxmlformats.org/presentationml/2006/main">
+  <p:cSld>
+    <p:spTree>
+      <p:nvGrpSpPr>
+        <p:cNvPr id="1" name=""/>
+        <p:cNvGrpSpPr/>
+        <p:nvPr/>
+      </p:nvGrpSpPr>
+      <p:grpSpPr>
+        <a:xfrm>
+          <a:off x="0" y="0"/>
+          <a:ext cx="0" cy="0"/>
+          <a:chOff x="0" y="0"/>
+          <a:chExt cx="0" cy="0"/>
+        </a:xfrm>
+      </p:grpSpPr>
+      <p:sp>
+        <p:nvSpPr>
+          <p:cNvPr id="2" name="Slide Image Placeholder 1"/>
+          <p:cNvSpPr>
+            <a:spLocks noGrp="1" noRot="1" noChangeAspect="1"/>
+          </p:cNvSpPr>
+          <p:nvPr>
+            <p:ph type="sldImg"/>
+          </p:nvPr>
+        </p:nvSpPr>
+        <p:spPr/>
+      </p:sp>
+      <p:sp>
+        <p:nvSpPr>
+          <p:cNvPr id="3" name="Notes Placeholder 2"/>
+          <p:cNvSpPr>
+            <a:spLocks noGrp="1"/>
+          </p:cNvSpPr>
+          <p:nvPr>
+            <p:ph type="body" idx="1"/>
+          </p:nvPr>
+        </p:nvSpPr>
+        <p:spPr/>
+        <p:txBody>
+          <a:bodyPr/>
+          <a:lstStyle/>
+          <a:p>
+            <a:endParaRPr lang="nl-BE"/>
+          </a:p>
+        </p:txBody>
+      </p:sp>
+      <p:sp>
+        <p:nvSpPr>
+          <p:cNvPr id="4" name="Slide Number Placeholder 3"/>
+          <p:cNvSpPr>
+            <a:spLocks noGrp="1"/>
+          </p:cNvSpPr>
+          <p:nvPr>
+            <p:ph type="sldNum" sz="quarter" idx="10"/>
+          </p:nvPr>
+        </p:nvSpPr>
+        <p:spPr/>
+        <p:txBody>
+          <a:bodyPr/>
+          <a:lstStyle/>
+          <a:p>
+            <a:fld id="{F1B74BCE-2F86-4025-ABE5-8DEE86D7782F}" type="slidenum">
+              <a:rPr lang="nl-BE" smtClean="0"/>
+              <a:t>14</a:t>
+            </a:fld>
+            <a:endParaRPr lang="nl-BE"/>
+          </a:p>
+        </p:txBody>
+      </p:sp>
+    </p:spTree>
+    <p:extLst>
+      <p:ext uri="{BB962C8B-B14F-4D97-AF65-F5344CB8AC3E}">
+        <p14:creationId xmlns:p14="http://schemas.microsoft.com/office/powerpoint/2010/main" val="3103368003"/>
+      </p:ext>
+    </p:extLst>
+  </p:cSld>
+  <p:clrMapOvr>
+    <a:masterClrMapping/>
+  </p:clrMapOvr>
+</p:notes>
+</file>
+
 <file path=ppt/notesSlides/notesSlide2.xml><?xml version="1.0" encoding="utf-8"?>
 <p:notes xmlns:a="http://schemas.openxmlformats.org/drawingml/2006/main" xmlns:r="http://schemas.openxmlformats.org/officeDocument/2006/relationships" xmlns:p="http://schemas.openxmlformats.org/presentationml/2006/main">
   <p:cSld>
@@ -1191,7 +1373,7 @@
           <a:p>
             <a:r>
               <a:rPr lang="nl-BE" baseline="0" dirty="0" smtClean="0"/>
-              <a:t>Veel eigenschappen van de muziek zijn zichtbaar in het spectrogram. Uit de verticale lijnen kan je het ritme afleiden, de horizontale lijnen worden bepaald door de melodie.</a:t>
+              <a:t>Veel eigenschappen van de muziek zijn zichtbaar in het spectrogram. Uit de verticale lijnen kan je veel informatie over het ritme afleiden, de horizontale lijnen worden bepaald door de melodie.</a:t>
             </a:r>
           </a:p>
           <a:p>
@@ -2408,9 +2590,9 @@
           <a:bodyPr/>
           <a:lstStyle/>
           <a:p>
-            <a:fld id="{B1B6FC11-F68B-4BCA-9AE1-CDAA20C4D613}" type="datetimeFigureOut">
+            <a:fld id="{4C3A3588-0C81-488E-80E8-71281FA65EDA}" type="datetime1">
               <a:rPr lang="nl-BE" smtClean="0"/>
-              <a:t>5/04/2016</a:t>
+              <a:t>27/04/2016</a:t>
             </a:fld>
             <a:endParaRPr lang="nl-BE"/>
           </a:p>
@@ -2452,9 +2634,14 @@
           <a:p>
             <a:fld id="{E8DE238E-16BA-439B-8635-94B95965949D}" type="slidenum">
               <a:rPr lang="nl-BE" smtClean="0"/>
+              <a:pPr/>
               <a:t>‹#›</a:t>
             </a:fld>
-            <a:endParaRPr lang="nl-BE"/>
+            <a:r>
+              <a:rPr lang="nl-BE" dirty="0" smtClean="0"/>
+              <a:t>/16</a:t>
+            </a:r>
+            <a:endParaRPr lang="nl-BE" dirty="0"/>
           </a:p>
         </p:txBody>
       </p:sp>
@@ -2468,6 +2655,13 @@
   <p:clrMapOvr>
     <a:masterClrMapping/>
   </p:clrMapOvr>
+  <p:timing>
+    <p:tnLst>
+      <p:par>
+        <p:cTn id="1" dur="indefinite" restart="never" nodeType="tmRoot"/>
+      </p:par>
+    </p:tnLst>
+  </p:timing>
 </p:sldLayout>
 </file>
 
@@ -2659,9 +2853,9 @@
           <a:bodyPr/>
           <a:lstStyle/>
           <a:p>
-            <a:fld id="{B1B6FC11-F68B-4BCA-9AE1-CDAA20C4D613}" type="datetimeFigureOut">
+            <a:fld id="{7E97D98C-CAE1-44D5-B9EF-9A94718F178C}" type="datetime1">
               <a:rPr lang="nl-BE" smtClean="0"/>
-              <a:t>5/04/2016</a:t>
+              <a:t>27/04/2016</a:t>
             </a:fld>
             <a:endParaRPr lang="nl-BE"/>
           </a:p>
@@ -2705,7 +2899,7 @@
               <a:rPr lang="nl-BE" smtClean="0"/>
               <a:t>‹#›</a:t>
             </a:fld>
-            <a:endParaRPr lang="nl-BE"/>
+            <a:endParaRPr lang="nl-BE" dirty="0"/>
           </a:p>
         </p:txBody>
       </p:sp>
@@ -2719,6 +2913,13 @@
   <p:clrMapOvr>
     <a:masterClrMapping/>
   </p:clrMapOvr>
+  <p:timing>
+    <p:tnLst>
+      <p:par>
+        <p:cTn id="1" dur="indefinite" restart="never" nodeType="tmRoot"/>
+      </p:par>
+    </p:tnLst>
+  </p:timing>
 </p:sldLayout>
 </file>
 
@@ -2973,9 +3174,9 @@
           <a:bodyPr/>
           <a:lstStyle/>
           <a:p>
-            <a:fld id="{B1B6FC11-F68B-4BCA-9AE1-CDAA20C4D613}" type="datetimeFigureOut">
+            <a:fld id="{83B170BD-2670-44B6-A201-0D181521382B}" type="datetime1">
               <a:rPr lang="nl-BE" smtClean="0"/>
-              <a:t>5/04/2016</a:t>
+              <a:t>27/04/2016</a:t>
             </a:fld>
             <a:endParaRPr lang="nl-BE"/>
           </a:p>
@@ -3019,7 +3220,7 @@
               <a:rPr lang="nl-BE" smtClean="0"/>
               <a:t>‹#›</a:t>
             </a:fld>
-            <a:endParaRPr lang="nl-BE"/>
+            <a:endParaRPr lang="nl-BE" dirty="0"/>
           </a:p>
         </p:txBody>
       </p:sp>
@@ -3115,6 +3316,13 @@
   <p:clrMapOvr>
     <a:masterClrMapping/>
   </p:clrMapOvr>
+  <p:timing>
+    <p:tnLst>
+      <p:par>
+        <p:cTn id="1" dur="indefinite" restart="never" nodeType="tmRoot"/>
+      </p:par>
+    </p:tnLst>
+  </p:timing>
 </p:sldLayout>
 </file>
 
@@ -3306,9 +3514,9 @@
           <a:bodyPr/>
           <a:lstStyle/>
           <a:p>
-            <a:fld id="{B1B6FC11-F68B-4BCA-9AE1-CDAA20C4D613}" type="datetimeFigureOut">
+            <a:fld id="{33451913-2070-4944-BBD3-EA87577D49D6}" type="datetime1">
               <a:rPr lang="nl-BE" smtClean="0"/>
-              <a:t>5/04/2016</a:t>
+              <a:t>27/04/2016</a:t>
             </a:fld>
             <a:endParaRPr lang="nl-BE"/>
           </a:p>
@@ -3352,7 +3560,7 @@
               <a:rPr lang="nl-BE" smtClean="0"/>
               <a:t>‹#›</a:t>
             </a:fld>
-            <a:endParaRPr lang="nl-BE"/>
+            <a:endParaRPr lang="nl-BE" dirty="0"/>
           </a:p>
         </p:txBody>
       </p:sp>
@@ -3366,6 +3574,13 @@
   <p:clrMapOvr>
     <a:masterClrMapping/>
   </p:clrMapOvr>
+  <p:timing>
+    <p:tnLst>
+      <p:par>
+        <p:cTn id="1" dur="indefinite" restart="never" nodeType="tmRoot"/>
+      </p:par>
+    </p:tnLst>
+  </p:timing>
 </p:sldLayout>
 </file>
 
@@ -3620,9 +3835,9 @@
           <a:bodyPr/>
           <a:lstStyle/>
           <a:p>
-            <a:fld id="{B1B6FC11-F68B-4BCA-9AE1-CDAA20C4D613}" type="datetimeFigureOut">
+            <a:fld id="{808F7857-D4EC-4ABA-AFBA-6EE2DD52F09E}" type="datetime1">
               <a:rPr lang="nl-BE" smtClean="0"/>
-              <a:t>5/04/2016</a:t>
+              <a:t>27/04/2016</a:t>
             </a:fld>
             <a:endParaRPr lang="nl-BE"/>
           </a:p>
@@ -3666,7 +3881,7 @@
               <a:rPr lang="nl-BE" smtClean="0"/>
               <a:t>‹#›</a:t>
             </a:fld>
-            <a:endParaRPr lang="nl-BE"/>
+            <a:endParaRPr lang="nl-BE" dirty="0"/>
           </a:p>
         </p:txBody>
       </p:sp>
@@ -3762,6 +3977,13 @@
   <p:clrMapOvr>
     <a:masterClrMapping/>
   </p:clrMapOvr>
+  <p:timing>
+    <p:tnLst>
+      <p:par>
+        <p:cTn id="1" dur="indefinite" restart="never" nodeType="tmRoot"/>
+      </p:par>
+    </p:tnLst>
+  </p:timing>
 </p:sldLayout>
 </file>
 
@@ -4013,9 +4235,9 @@
           <a:bodyPr/>
           <a:lstStyle/>
           <a:p>
-            <a:fld id="{B1B6FC11-F68B-4BCA-9AE1-CDAA20C4D613}" type="datetimeFigureOut">
+            <a:fld id="{5E7C51A9-1265-404C-8E7E-852CEE42953D}" type="datetime1">
               <a:rPr lang="nl-BE" smtClean="0"/>
-              <a:t>5/04/2016</a:t>
+              <a:t>27/04/2016</a:t>
             </a:fld>
             <a:endParaRPr lang="nl-BE"/>
           </a:p>
@@ -4059,7 +4281,7 @@
               <a:rPr lang="nl-BE" smtClean="0"/>
               <a:t>‹#›</a:t>
             </a:fld>
-            <a:endParaRPr lang="nl-BE"/>
+            <a:endParaRPr lang="nl-BE" dirty="0"/>
           </a:p>
         </p:txBody>
       </p:sp>
@@ -4073,6 +4295,13 @@
   <p:clrMapOvr>
     <a:masterClrMapping/>
   </p:clrMapOvr>
+  <p:timing>
+    <p:tnLst>
+      <p:par>
+        <p:cTn id="1" dur="indefinite" restart="never" nodeType="tmRoot"/>
+      </p:par>
+    </p:tnLst>
+  </p:timing>
 </p:sldLayout>
 </file>
 
@@ -4183,9 +4412,9 @@
           <a:bodyPr/>
           <a:lstStyle/>
           <a:p>
-            <a:fld id="{B1B6FC11-F68B-4BCA-9AE1-CDAA20C4D613}" type="datetimeFigureOut">
+            <a:fld id="{5F172A62-D213-4A0F-8954-C43FCEB51251}" type="datetime1">
               <a:rPr lang="nl-BE" smtClean="0"/>
-              <a:t>5/04/2016</a:t>
+              <a:t>27/04/2016</a:t>
             </a:fld>
             <a:endParaRPr lang="nl-BE"/>
           </a:p>
@@ -4229,7 +4458,7 @@
               <a:rPr lang="nl-BE" smtClean="0"/>
               <a:t>‹#›</a:t>
             </a:fld>
-            <a:endParaRPr lang="nl-BE"/>
+            <a:endParaRPr lang="nl-BE" dirty="0"/>
           </a:p>
         </p:txBody>
       </p:sp>
@@ -4243,6 +4472,13 @@
   <p:clrMapOvr>
     <a:masterClrMapping/>
   </p:clrMapOvr>
+  <p:timing>
+    <p:tnLst>
+      <p:par>
+        <p:cTn id="1" dur="indefinite" restart="never" nodeType="tmRoot"/>
+      </p:par>
+    </p:tnLst>
+  </p:timing>
 </p:sldLayout>
 </file>
 
@@ -4363,9 +4599,9 @@
           <a:bodyPr/>
           <a:lstStyle/>
           <a:p>
-            <a:fld id="{B1B6FC11-F68B-4BCA-9AE1-CDAA20C4D613}" type="datetimeFigureOut">
+            <a:fld id="{73986EFB-C369-487E-A2AC-2297769CFFB8}" type="datetime1">
               <a:rPr lang="nl-BE" smtClean="0"/>
-              <a:t>5/04/2016</a:t>
+              <a:t>27/04/2016</a:t>
             </a:fld>
             <a:endParaRPr lang="nl-BE"/>
           </a:p>
@@ -4409,7 +4645,7 @@
               <a:rPr lang="nl-BE" smtClean="0"/>
               <a:t>‹#›</a:t>
             </a:fld>
-            <a:endParaRPr lang="nl-BE"/>
+            <a:endParaRPr lang="nl-BE" dirty="0"/>
           </a:p>
         </p:txBody>
       </p:sp>
@@ -4423,6 +4659,13 @@
   <p:clrMapOvr>
     <a:masterClrMapping/>
   </p:clrMapOvr>
+  <p:timing>
+    <p:tnLst>
+      <p:par>
+        <p:cTn id="1" dur="indefinite" restart="never" nodeType="tmRoot"/>
+      </p:par>
+    </p:tnLst>
+  </p:timing>
 </p:sldLayout>
 </file>
 
@@ -4533,9 +4776,9 @@
           <a:bodyPr/>
           <a:lstStyle/>
           <a:p>
-            <a:fld id="{B1B6FC11-F68B-4BCA-9AE1-CDAA20C4D613}" type="datetimeFigureOut">
+            <a:fld id="{98068DAA-D3FA-4DA2-97E5-155B79F87554}" type="datetime1">
               <a:rPr lang="nl-BE" smtClean="0"/>
-              <a:t>5/04/2016</a:t>
+              <a:t>27/04/2016</a:t>
             </a:fld>
             <a:endParaRPr lang="nl-BE"/>
           </a:p>
@@ -4573,13 +4816,32 @@
         <p:spPr/>
         <p:txBody>
           <a:bodyPr/>
-          <a:lstStyle/>
+          <a:lstStyle>
+            <a:lvl1pPr marL="0" marR="0" indent="0" algn="r" defTabSz="457200" rtl="0" eaLnBrk="1" fontAlgn="auto" latinLnBrk="0" hangingPunct="1">
+              <a:lnSpc>
+                <a:spcPct val="100000"/>
+              </a:lnSpc>
+              <a:spcBef>
+                <a:spcPts val="0"/>
+              </a:spcBef>
+              <a:spcAft>
+                <a:spcPts val="0"/>
+              </a:spcAft>
+              <a:buClrTx/>
+              <a:buSzTx/>
+              <a:buFontTx/>
+              <a:buNone/>
+              <a:tabLst/>
+              <a:defRPr/>
+            </a:lvl1pPr>
+          </a:lstStyle>
           <a:p>
             <a:fld id="{E8DE238E-16BA-439B-8635-94B95965949D}" type="slidenum">
               <a:rPr lang="nl-BE" smtClean="0"/>
+              <a:pPr/>
               <a:t>‹#›</a:t>
             </a:fld>
-            <a:endParaRPr lang="nl-BE"/>
+            <a:endParaRPr lang="nl-BE" dirty="0" smtClean="0"/>
           </a:p>
         </p:txBody>
       </p:sp>
@@ -4593,6 +4855,13 @@
   <p:clrMapOvr>
     <a:masterClrMapping/>
   </p:clrMapOvr>
+  <p:timing>
+    <p:tnLst>
+      <p:par>
+        <p:cTn id="1" dur="indefinite" restart="never" nodeType="tmRoot"/>
+      </p:par>
+    </p:tnLst>
+  </p:timing>
 </p:sldLayout>
 </file>
 
@@ -4780,9 +5049,9 @@
           <a:bodyPr/>
           <a:lstStyle/>
           <a:p>
-            <a:fld id="{B1B6FC11-F68B-4BCA-9AE1-CDAA20C4D613}" type="datetimeFigureOut">
+            <a:fld id="{1F4E5437-0072-4CF8-AA17-C4E6FF4714A3}" type="datetime1">
               <a:rPr lang="nl-BE" smtClean="0"/>
-              <a:t>5/04/2016</a:t>
+              <a:t>27/04/2016</a:t>
             </a:fld>
             <a:endParaRPr lang="nl-BE"/>
           </a:p>
@@ -4820,13 +5089,32 @@
         <p:spPr/>
         <p:txBody>
           <a:bodyPr/>
-          <a:lstStyle/>
+          <a:lstStyle>
+            <a:lvl1pPr marL="0" marR="0" indent="0" algn="r" defTabSz="457200" rtl="0" eaLnBrk="1" fontAlgn="auto" latinLnBrk="0" hangingPunct="1">
+              <a:lnSpc>
+                <a:spcPct val="100000"/>
+              </a:lnSpc>
+              <a:spcBef>
+                <a:spcPts val="0"/>
+              </a:spcBef>
+              <a:spcAft>
+                <a:spcPts val="0"/>
+              </a:spcAft>
+              <a:buClrTx/>
+              <a:buSzTx/>
+              <a:buFontTx/>
+              <a:buNone/>
+              <a:tabLst/>
+              <a:defRPr/>
+            </a:lvl1pPr>
+          </a:lstStyle>
           <a:p>
             <a:fld id="{E8DE238E-16BA-439B-8635-94B95965949D}" type="slidenum">
               <a:rPr lang="nl-BE" smtClean="0"/>
+              <a:pPr/>
               <a:t>‹#›</a:t>
             </a:fld>
-            <a:endParaRPr lang="nl-BE"/>
+            <a:endParaRPr lang="nl-BE" dirty="0" smtClean="0"/>
           </a:p>
         </p:txBody>
       </p:sp>
@@ -4840,6 +5128,13 @@
   <p:clrMapOvr>
     <a:masterClrMapping/>
   </p:clrMapOvr>
+  <p:timing>
+    <p:tnLst>
+      <p:par>
+        <p:cTn id="1" dur="indefinite" restart="never" nodeType="tmRoot"/>
+      </p:par>
+    </p:tnLst>
+  </p:timing>
 </p:sldLayout>
 </file>
 
@@ -5077,9 +5372,9 @@
           <a:bodyPr/>
           <a:lstStyle/>
           <a:p>
-            <a:fld id="{B1B6FC11-F68B-4BCA-9AE1-CDAA20C4D613}" type="datetimeFigureOut">
+            <a:fld id="{BEE1738E-6F24-4E5F-86A0-13CBC4484DAE}" type="datetime1">
               <a:rPr lang="nl-BE" smtClean="0"/>
-              <a:t>5/04/2016</a:t>
+              <a:t>27/04/2016</a:t>
             </a:fld>
             <a:endParaRPr lang="nl-BE"/>
           </a:p>
@@ -5117,13 +5412,32 @@
         <p:spPr/>
         <p:txBody>
           <a:bodyPr/>
-          <a:lstStyle/>
+          <a:lstStyle>
+            <a:lvl1pPr marL="0" marR="0" indent="0" algn="r" defTabSz="457200" rtl="0" eaLnBrk="1" fontAlgn="auto" latinLnBrk="0" hangingPunct="1">
+              <a:lnSpc>
+                <a:spcPct val="100000"/>
+              </a:lnSpc>
+              <a:spcBef>
+                <a:spcPts val="0"/>
+              </a:spcBef>
+              <a:spcAft>
+                <a:spcPts val="0"/>
+              </a:spcAft>
+              <a:buClrTx/>
+              <a:buSzTx/>
+              <a:buFontTx/>
+              <a:buNone/>
+              <a:tabLst/>
+              <a:defRPr/>
+            </a:lvl1pPr>
+          </a:lstStyle>
           <a:p>
             <a:fld id="{E8DE238E-16BA-439B-8635-94B95965949D}" type="slidenum">
               <a:rPr lang="nl-BE" smtClean="0"/>
+              <a:pPr/>
               <a:t>‹#›</a:t>
             </a:fld>
-            <a:endParaRPr lang="nl-BE"/>
+            <a:endParaRPr lang="nl-BE" dirty="0" smtClean="0"/>
           </a:p>
         </p:txBody>
       </p:sp>
@@ -5137,6 +5451,13 @@
   <p:clrMapOvr>
     <a:masterClrMapping/>
   </p:clrMapOvr>
+  <p:timing>
+    <p:tnLst>
+      <p:par>
+        <p:cTn id="1" dur="indefinite" restart="never" nodeType="tmRoot"/>
+      </p:par>
+    </p:tnLst>
+  </p:timing>
 </p:sldLayout>
 </file>
 
@@ -5456,9 +5777,9 @@
           <a:bodyPr/>
           <a:lstStyle/>
           <a:p>
-            <a:fld id="{B1B6FC11-F68B-4BCA-9AE1-CDAA20C4D613}" type="datetimeFigureOut">
+            <a:fld id="{A3EC6F21-FF90-4166-A497-72A587136F39}" type="datetime1">
               <a:rPr lang="nl-BE" smtClean="0"/>
-              <a:t>5/04/2016</a:t>
+              <a:t>27/04/2016</a:t>
             </a:fld>
             <a:endParaRPr lang="nl-BE"/>
           </a:p>
@@ -5496,13 +5817,32 @@
         <p:spPr/>
         <p:txBody>
           <a:bodyPr/>
-          <a:lstStyle/>
+          <a:lstStyle>
+            <a:lvl1pPr marL="0" marR="0" indent="0" algn="r" defTabSz="457200" rtl="0" eaLnBrk="1" fontAlgn="auto" latinLnBrk="0" hangingPunct="1">
+              <a:lnSpc>
+                <a:spcPct val="100000"/>
+              </a:lnSpc>
+              <a:spcBef>
+                <a:spcPts val="0"/>
+              </a:spcBef>
+              <a:spcAft>
+                <a:spcPts val="0"/>
+              </a:spcAft>
+              <a:buClrTx/>
+              <a:buSzTx/>
+              <a:buFontTx/>
+              <a:buNone/>
+              <a:tabLst/>
+              <a:defRPr/>
+            </a:lvl1pPr>
+          </a:lstStyle>
           <a:p>
             <a:fld id="{E8DE238E-16BA-439B-8635-94B95965949D}" type="slidenum">
               <a:rPr lang="nl-BE" smtClean="0"/>
+              <a:pPr/>
               <a:t>‹#›</a:t>
             </a:fld>
-            <a:endParaRPr lang="nl-BE"/>
+            <a:endParaRPr lang="nl-BE" dirty="0" smtClean="0"/>
           </a:p>
         </p:txBody>
       </p:sp>
@@ -5516,6 +5856,13 @@
   <p:clrMapOvr>
     <a:masterClrMapping/>
   </p:clrMapOvr>
+  <p:timing>
+    <p:tnLst>
+      <p:par>
+        <p:cTn id="1" dur="indefinite" restart="never" nodeType="tmRoot"/>
+      </p:par>
+    </p:tnLst>
+  </p:timing>
 </p:sldLayout>
 </file>
 
@@ -5579,9 +5926,9 @@
           <a:bodyPr/>
           <a:lstStyle/>
           <a:p>
-            <a:fld id="{B1B6FC11-F68B-4BCA-9AE1-CDAA20C4D613}" type="datetimeFigureOut">
+            <a:fld id="{C07FA782-FB81-4001-8632-C7898391A64F}" type="datetime1">
               <a:rPr lang="nl-BE" smtClean="0"/>
-              <a:t>5/04/2016</a:t>
+              <a:t>27/04/2016</a:t>
             </a:fld>
             <a:endParaRPr lang="nl-BE"/>
           </a:p>
@@ -5623,9 +5970,10 @@
           <a:p>
             <a:fld id="{E8DE238E-16BA-439B-8635-94B95965949D}" type="slidenum">
               <a:rPr lang="nl-BE" smtClean="0"/>
+              <a:pPr/>
               <a:t>‹#›</a:t>
             </a:fld>
-            <a:endParaRPr lang="nl-BE"/>
+            <a:endParaRPr lang="nl-BE" dirty="0" smtClean="0"/>
           </a:p>
         </p:txBody>
       </p:sp>
@@ -5639,6 +5987,13 @@
   <p:clrMapOvr>
     <a:masterClrMapping/>
   </p:clrMapOvr>
+  <p:timing>
+    <p:tnLst>
+      <p:par>
+        <p:cTn id="1" dur="indefinite" restart="never" nodeType="tmRoot"/>
+      </p:par>
+    </p:tnLst>
+  </p:timing>
 </p:sldLayout>
 </file>
 
@@ -5674,9 +6029,9 @@
           <a:bodyPr/>
           <a:lstStyle/>
           <a:p>
-            <a:fld id="{B1B6FC11-F68B-4BCA-9AE1-CDAA20C4D613}" type="datetimeFigureOut">
+            <a:fld id="{92497581-8BE4-429E-9C56-E48790865B72}" type="datetime1">
               <a:rPr lang="nl-BE" smtClean="0"/>
-              <a:t>5/04/2016</a:t>
+              <a:t>27/04/2016</a:t>
             </a:fld>
             <a:endParaRPr lang="nl-BE"/>
           </a:p>
@@ -5720,7 +6075,7 @@
               <a:rPr lang="nl-BE" smtClean="0"/>
               <a:t>‹#›</a:t>
             </a:fld>
-            <a:endParaRPr lang="nl-BE"/>
+            <a:endParaRPr lang="nl-BE" dirty="0"/>
           </a:p>
         </p:txBody>
       </p:sp>
@@ -5734,6 +6089,13 @@
   <p:clrMapOvr>
     <a:masterClrMapping/>
   </p:clrMapOvr>
+  <p:timing>
+    <p:tnLst>
+      <p:par>
+        <p:cTn id="1" dur="indefinite" restart="never" nodeType="tmRoot"/>
+      </p:par>
+    </p:tnLst>
+  </p:timing>
 </p:sldLayout>
 </file>
 
@@ -5929,9 +6291,9 @@
           <a:bodyPr/>
           <a:lstStyle/>
           <a:p>
-            <a:fld id="{B1B6FC11-F68B-4BCA-9AE1-CDAA20C4D613}" type="datetimeFigureOut">
+            <a:fld id="{E7F6DB7C-1BBC-4F04-A0AB-68716329956E}" type="datetime1">
               <a:rPr lang="nl-BE" smtClean="0"/>
-              <a:t>5/04/2016</a:t>
+              <a:t>27/04/2016</a:t>
             </a:fld>
             <a:endParaRPr lang="nl-BE"/>
           </a:p>
@@ -5975,7 +6337,7 @@
               <a:rPr lang="nl-BE" smtClean="0"/>
               <a:t>‹#›</a:t>
             </a:fld>
-            <a:endParaRPr lang="nl-BE"/>
+            <a:endParaRPr lang="nl-BE" dirty="0"/>
           </a:p>
         </p:txBody>
       </p:sp>
@@ -5989,6 +6351,13 @@
   <p:clrMapOvr>
     <a:masterClrMapping/>
   </p:clrMapOvr>
+  <p:timing>
+    <p:tnLst>
+      <p:par>
+        <p:cTn id="1" dur="indefinite" restart="never" nodeType="tmRoot"/>
+      </p:par>
+    </p:tnLst>
+  </p:timing>
 </p:sldLayout>
 </file>
 
@@ -6192,9 +6561,9 @@
           <a:bodyPr/>
           <a:lstStyle/>
           <a:p>
-            <a:fld id="{B1B6FC11-F68B-4BCA-9AE1-CDAA20C4D613}" type="datetimeFigureOut">
+            <a:fld id="{819817BB-16B3-468B-8842-B9E7A53F14FA}" type="datetime1">
               <a:rPr lang="nl-BE" smtClean="0"/>
-              <a:t>5/04/2016</a:t>
+              <a:t>27/04/2016</a:t>
             </a:fld>
             <a:endParaRPr lang="nl-BE"/>
           </a:p>
@@ -6238,7 +6607,7 @@
               <a:rPr lang="nl-BE" smtClean="0"/>
               <a:t>‹#›</a:t>
             </a:fld>
-            <a:endParaRPr lang="nl-BE"/>
+            <a:endParaRPr lang="nl-BE" dirty="0"/>
           </a:p>
         </p:txBody>
       </p:sp>
@@ -6252,6 +6621,13 @@
   <p:clrMapOvr>
     <a:masterClrMapping/>
   </p:clrMapOvr>
+  <p:timing>
+    <p:tnLst>
+      <p:par>
+        <p:cTn id="1" dur="indefinite" restart="never" nodeType="tmRoot"/>
+      </p:par>
+    </p:tnLst>
+  </p:timing>
 </p:sldLayout>
 </file>
 
@@ -7006,9 +7382,9 @@
             </a:lvl1pPr>
           </a:lstStyle>
           <a:p>
-            <a:fld id="{B1B6FC11-F68B-4BCA-9AE1-CDAA20C4D613}" type="datetimeFigureOut">
+            <a:fld id="{5FA03D89-64AA-45E4-BEA8-265EEA372296}" type="datetime1">
               <a:rPr lang="nl-BE" smtClean="0"/>
-              <a:t>5/04/2016</a:t>
+              <a:t>27/04/2016</a:t>
             </a:fld>
             <a:endParaRPr lang="nl-BE"/>
           </a:p>
@@ -7063,7 +7439,7 @@
         </p:nvSpPr>
         <p:spPr>
           <a:xfrm>
-            <a:off x="6444676" y="6041363"/>
+            <a:off x="8604408" y="6485862"/>
             <a:ext cx="512638" cy="365125"/>
           </a:xfrm>
           <a:prstGeom prst="rect">
@@ -7076,7 +7452,7 @@
             <a:lvl1pPr algn="r">
               <a:defRPr sz="900">
                 <a:solidFill>
-                  <a:schemeClr val="accent1"/>
+                  <a:schemeClr val="tx1"/>
                 </a:solidFill>
               </a:defRPr>
             </a:lvl1pPr>
@@ -7084,9 +7460,10 @@
           <a:p>
             <a:fld id="{E8DE238E-16BA-439B-8635-94B95965949D}" type="slidenum">
               <a:rPr lang="nl-BE" smtClean="0"/>
+              <a:pPr/>
               <a:t>‹#›</a:t>
             </a:fld>
-            <a:endParaRPr lang="nl-BE"/>
+            <a:endParaRPr lang="nl-BE" dirty="0" smtClean="0"/>
           </a:p>
         </p:txBody>
       </p:sp>
@@ -7116,6 +7493,14 @@
     <p:sldLayoutId id="2147483692" r:id="rId15"/>
     <p:sldLayoutId id="2147483693" r:id="rId16"/>
   </p:sldLayoutIdLst>
+  <p:timing>
+    <p:tnLst>
+      <p:par>
+        <p:cTn id="1" dur="indefinite" restart="never" nodeType="tmRoot"/>
+      </p:par>
+    </p:tnLst>
+  </p:timing>
+  <p:hf hdr="0" ftr="0" dt="0"/>
   <p:txStyles>
     <p:titleStyle>
       <a:lvl1pPr algn="l" defTabSz="457200" rtl="0" eaLnBrk="1" latinLnBrk="0" hangingPunct="1">
@@ -7688,6 +8073,29 @@
           </a:p>
         </p:txBody>
       </p:sp>
+      <p:sp>
+        <p:nvSpPr>
+          <p:cNvPr id="5" name="Slide Number Placeholder 4"/>
+          <p:cNvSpPr>
+            <a:spLocks noGrp="1"/>
+          </p:cNvSpPr>
+          <p:nvPr>
+            <p:ph type="sldNum" sz="quarter" idx="12"/>
+          </p:nvPr>
+        </p:nvSpPr>
+        <p:spPr/>
+        <p:txBody>
+          <a:bodyPr/>
+          <a:lstStyle/>
+          <a:p>
+            <a:fld id="{E8DE238E-16BA-439B-8635-94B95965949D}" type="slidenum">
+              <a:rPr lang="nl-BE" smtClean="0"/>
+              <a:t>1</a:t>
+            </a:fld>
+            <a:endParaRPr lang="nl-BE"/>
+          </a:p>
+        </p:txBody>
+      </p:sp>
     </p:spTree>
     <p:extLst>
       <p:ext uri="{BB962C8B-B14F-4D97-AF65-F5344CB8AC3E}">
@@ -7903,14 +8311,14 @@
       </p:pic>
       <p:pic>
         <p:nvPicPr>
-          <p:cNvPr id="10" name="Picture 9"/>
+          <p:cNvPr id="6" name="Picture 5"/>
           <p:cNvPicPr>
             <a:picLocks noChangeAspect="1"/>
           </p:cNvPicPr>
           <p:nvPr/>
         </p:nvPicPr>
         <p:blipFill>
-          <a:blip r:embed="rId4" cstate="print">
+          <a:blip r:embed="rId4">
             <a:extLst>
               <a:ext uri="{28A0092B-C50C-407E-A947-70E740481C1C}">
                 <a14:useLocalDpi xmlns:a14="http://schemas.microsoft.com/office/drawing/2010/main" val="0"/>
@@ -7923,14 +8331,37 @@
         </p:blipFill>
         <p:spPr>
           <a:xfrm>
-            <a:off x="1485898" y="2736272"/>
-            <a:ext cx="3568702" cy="1809797"/>
+            <a:off x="1378811" y="2717799"/>
+            <a:ext cx="3135762" cy="1767937"/>
           </a:xfrm>
           <a:prstGeom prst="rect">
             <a:avLst/>
           </a:prstGeom>
         </p:spPr>
       </p:pic>
+      <p:sp>
+        <p:nvSpPr>
+          <p:cNvPr id="8" name="Slide Number Placeholder 7"/>
+          <p:cNvSpPr>
+            <a:spLocks noGrp="1"/>
+          </p:cNvSpPr>
+          <p:nvPr>
+            <p:ph type="sldNum" sz="quarter" idx="12"/>
+          </p:nvPr>
+        </p:nvSpPr>
+        <p:spPr/>
+        <p:txBody>
+          <a:bodyPr/>
+          <a:lstStyle/>
+          <a:p>
+            <a:fld id="{E8DE238E-16BA-439B-8635-94B95965949D}" type="slidenum">
+              <a:rPr lang="nl-BE" smtClean="0"/>
+              <a:t>10</a:t>
+            </a:fld>
+            <a:endParaRPr lang="nl-BE" dirty="0"/>
+          </a:p>
+        </p:txBody>
+      </p:sp>
     </p:spTree>
     <p:extLst>
       <p:ext uri="{BB962C8B-B14F-4D97-AF65-F5344CB8AC3E}">
@@ -8110,6 +8541,29 @@
           </a:extLst>
         </p:spPr>
       </p:pic>
+      <p:sp>
+        <p:nvSpPr>
+          <p:cNvPr id="7" name="Slide Number Placeholder 6"/>
+          <p:cNvSpPr>
+            <a:spLocks noGrp="1"/>
+          </p:cNvSpPr>
+          <p:nvPr>
+            <p:ph type="sldNum" sz="quarter" idx="12"/>
+          </p:nvPr>
+        </p:nvSpPr>
+        <p:spPr/>
+        <p:txBody>
+          <a:bodyPr/>
+          <a:lstStyle/>
+          <a:p>
+            <a:fld id="{E8DE238E-16BA-439B-8635-94B95965949D}" type="slidenum">
+              <a:rPr lang="nl-BE" smtClean="0"/>
+              <a:t>11</a:t>
+            </a:fld>
+            <a:endParaRPr lang="nl-BE" dirty="0"/>
+          </a:p>
+        </p:txBody>
+      </p:sp>
     </p:spTree>
     <p:extLst>
       <p:ext uri="{BB962C8B-B14F-4D97-AF65-F5344CB8AC3E}">
@@ -8307,6 +8761,29 @@
           </a:extLst>
         </p:spPr>
       </p:pic>
+      <p:sp>
+        <p:nvSpPr>
+          <p:cNvPr id="7" name="Slide Number Placeholder 6"/>
+          <p:cNvSpPr>
+            <a:spLocks noGrp="1"/>
+          </p:cNvSpPr>
+          <p:nvPr>
+            <p:ph type="sldNum" sz="quarter" idx="12"/>
+          </p:nvPr>
+        </p:nvSpPr>
+        <p:spPr/>
+        <p:txBody>
+          <a:bodyPr/>
+          <a:lstStyle/>
+          <a:p>
+            <a:fld id="{E8DE238E-16BA-439B-8635-94B95965949D}" type="slidenum">
+              <a:rPr lang="nl-BE" smtClean="0"/>
+              <a:t>12</a:t>
+            </a:fld>
+            <a:endParaRPr lang="nl-BE" dirty="0"/>
+          </a:p>
+        </p:txBody>
+      </p:sp>
     </p:spTree>
     <p:extLst>
       <p:ext uri="{BB962C8B-B14F-4D97-AF65-F5344CB8AC3E}">
@@ -8354,6 +8831,121 @@
             <p:ph type="title"/>
           </p:nvPr>
         </p:nvSpPr>
+        <p:spPr/>
+        <p:txBody>
+          <a:bodyPr/>
+          <a:lstStyle/>
+          <a:p>
+            <a:r>
+              <a:rPr lang="nl-BE" dirty="0" smtClean="0"/>
+              <a:t>Plug-in / </a:t>
+            </a:r>
+            <a:r>
+              <a:rPr lang="nl-BE" smtClean="0"/>
+              <a:t>grafische </a:t>
+            </a:r>
+            <a:r>
+              <a:rPr lang="nl-BE" smtClean="0"/>
+              <a:t>interface</a:t>
+            </a:r>
+            <a:endParaRPr lang="nl-BE" dirty="0"/>
+          </a:p>
+        </p:txBody>
+      </p:sp>
+      <p:pic>
+        <p:nvPicPr>
+          <p:cNvPr id="5" name="Picture 4"/>
+          <p:cNvPicPr>
+            <a:picLocks noChangeAspect="1"/>
+          </p:cNvPicPr>
+          <p:nvPr/>
+        </p:nvPicPr>
+        <p:blipFill>
+          <a:blip r:embed="rId3"/>
+          <a:stretch>
+            <a:fillRect/>
+          </a:stretch>
+        </p:blipFill>
+        <p:spPr>
+          <a:xfrm>
+            <a:off x="402563" y="1551047"/>
+            <a:ext cx="6896100" cy="4791075"/>
+          </a:xfrm>
+          <a:prstGeom prst="rect">
+            <a:avLst/>
+          </a:prstGeom>
+        </p:spPr>
+      </p:pic>
+      <p:sp>
+        <p:nvSpPr>
+          <p:cNvPr id="8" name="Slide Number Placeholder 7"/>
+          <p:cNvSpPr>
+            <a:spLocks noGrp="1"/>
+          </p:cNvSpPr>
+          <p:nvPr>
+            <p:ph type="sldNum" sz="quarter" idx="12"/>
+          </p:nvPr>
+        </p:nvSpPr>
+        <p:spPr/>
+        <p:txBody>
+          <a:bodyPr/>
+          <a:lstStyle/>
+          <a:p>
+            <a:fld id="{E8DE238E-16BA-439B-8635-94B95965949D}" type="slidenum">
+              <a:rPr lang="nl-BE" smtClean="0"/>
+              <a:t>13</a:t>
+            </a:fld>
+            <a:endParaRPr lang="nl-BE" dirty="0"/>
+          </a:p>
+        </p:txBody>
+      </p:sp>
+    </p:spTree>
+    <p:extLst>
+      <p:ext uri="{BB962C8B-B14F-4D97-AF65-F5344CB8AC3E}">
+        <p14:creationId xmlns:p14="http://schemas.microsoft.com/office/powerpoint/2010/main" val="1609766927"/>
+      </p:ext>
+    </p:extLst>
+  </p:cSld>
+  <p:clrMapOvr>
+    <a:masterClrMapping/>
+  </p:clrMapOvr>
+  <p:timing>
+    <p:tnLst>
+      <p:par>
+        <p:cTn id="1" dur="indefinite" restart="never" nodeType="tmRoot"/>
+      </p:par>
+    </p:tnLst>
+  </p:timing>
+</p:sld>
+</file>
+
+<file path=ppt/slides/slide14.xml><?xml version="1.0" encoding="utf-8"?>
+<p:sld xmlns:a="http://schemas.openxmlformats.org/drawingml/2006/main" xmlns:r="http://schemas.openxmlformats.org/officeDocument/2006/relationships" xmlns:p="http://schemas.openxmlformats.org/presentationml/2006/main">
+  <p:cSld>
+    <p:spTree>
+      <p:nvGrpSpPr>
+        <p:cNvPr id="1" name=""/>
+        <p:cNvGrpSpPr/>
+        <p:nvPr/>
+      </p:nvGrpSpPr>
+      <p:grpSpPr>
+        <a:xfrm>
+          <a:off x="0" y="0"/>
+          <a:ext cx="0" cy="0"/>
+          <a:chOff x="0" y="0"/>
+          <a:chExt cx="0" cy="0"/>
+        </a:xfrm>
+      </p:grpSpPr>
+      <p:sp>
+        <p:nvSpPr>
+          <p:cNvPr id="2" name="Title 1"/>
+          <p:cNvSpPr>
+            <a:spLocks noGrp="1"/>
+          </p:cNvSpPr>
+          <p:nvPr>
+            <p:ph type="title"/>
+          </p:nvPr>
+        </p:nvSpPr>
         <p:spPr>
           <a:xfrm>
             <a:off x="750443" y="927100"/>
@@ -8384,7 +8976,7 @@
           <p:nvPr/>
         </p:nvPicPr>
         <p:blipFill>
-          <a:blip r:embed="rId2" cstate="print">
+          <a:blip r:embed="rId3" cstate="print">
             <a:extLst>
               <a:ext uri="{28A0092B-C50C-407E-A947-70E740481C1C}">
                 <a14:useLocalDpi xmlns:a14="http://schemas.microsoft.com/office/drawing/2010/main" val="0"/>
@@ -8414,7 +9006,7 @@
           <p:nvPr/>
         </p:nvPicPr>
         <p:blipFill>
-          <a:blip r:embed="rId3" cstate="print">
+          <a:blip r:embed="rId4" cstate="print">
             <a:extLst>
               <a:ext uri="{28A0092B-C50C-407E-A947-70E740481C1C}">
                 <a14:useLocalDpi xmlns:a14="http://schemas.microsoft.com/office/drawing/2010/main" val="0"/>
@@ -8446,6 +9038,29 @@
           </a:extLst>
         </p:spPr>
       </p:pic>
+      <p:sp>
+        <p:nvSpPr>
+          <p:cNvPr id="7" name="Slide Number Placeholder 6"/>
+          <p:cNvSpPr>
+            <a:spLocks noGrp="1"/>
+          </p:cNvSpPr>
+          <p:nvPr>
+            <p:ph type="sldNum" sz="quarter" idx="12"/>
+          </p:nvPr>
+        </p:nvSpPr>
+        <p:spPr/>
+        <p:txBody>
+          <a:bodyPr/>
+          <a:lstStyle/>
+          <a:p>
+            <a:fld id="{E8DE238E-16BA-439B-8635-94B95965949D}" type="slidenum">
+              <a:rPr lang="nl-BE" smtClean="0"/>
+              <a:t>14</a:t>
+            </a:fld>
+            <a:endParaRPr lang="nl-BE" dirty="0"/>
+          </a:p>
+        </p:txBody>
+      </p:sp>
     </p:spTree>
     <p:extLst>
       <p:ext uri="{BB962C8B-B14F-4D97-AF65-F5344CB8AC3E}">
@@ -8456,6 +9071,13 @@
   <p:clrMapOvr>
     <a:masterClrMapping/>
   </p:clrMapOvr>
+  <p:timing>
+    <p:tnLst>
+      <p:par>
+        <p:cTn id="1" dur="indefinite" restart="never" nodeType="tmRoot"/>
+      </p:par>
+    </p:tnLst>
+  </p:timing>
 </p:sld>
 </file>
 
@@ -8594,6 +9216,29 @@
           </a:extLst>
         </p:spPr>
       </p:pic>
+      <p:sp>
+        <p:nvSpPr>
+          <p:cNvPr id="7" name="Slide Number Placeholder 6"/>
+          <p:cNvSpPr>
+            <a:spLocks noGrp="1"/>
+          </p:cNvSpPr>
+          <p:nvPr>
+            <p:ph type="sldNum" sz="quarter" idx="12"/>
+          </p:nvPr>
+        </p:nvSpPr>
+        <p:spPr/>
+        <p:txBody>
+          <a:bodyPr/>
+          <a:lstStyle/>
+          <a:p>
+            <a:fld id="{E8DE238E-16BA-439B-8635-94B95965949D}" type="slidenum">
+              <a:rPr lang="nl-BE" smtClean="0"/>
+              <a:t>2</a:t>
+            </a:fld>
+            <a:endParaRPr lang="nl-BE" dirty="0"/>
+          </a:p>
+        </p:txBody>
+      </p:sp>
     </p:spTree>
     <p:extLst>
       <p:ext uri="{BB962C8B-B14F-4D97-AF65-F5344CB8AC3E}">
@@ -8670,7 +9315,7 @@
           <a:lstStyle/>
           <a:p>
             <a:r>
-              <a:rPr lang="nl-BE" dirty="0" smtClean="0">
+              <a:rPr lang="nl-BE" sz="2000" dirty="0" smtClean="0">
                 <a:solidFill>
                   <a:schemeClr val="tx1"/>
                 </a:solidFill>
@@ -8680,7 +9325,7 @@
           </a:p>
           <a:p>
             <a:r>
-              <a:rPr lang="nl-BE" dirty="0" smtClean="0">
+              <a:rPr lang="nl-BE" sz="2000" dirty="0" smtClean="0">
                 <a:solidFill>
                   <a:schemeClr val="tx1"/>
                 </a:solidFill>
@@ -8691,7 +9336,7 @@
           <a:p>
             <a:pPr lvl="1"/>
             <a:r>
-              <a:rPr lang="nl-BE" dirty="0" smtClean="0">
+              <a:rPr lang="nl-BE" sz="2000" dirty="0" smtClean="0">
                 <a:solidFill>
                   <a:schemeClr val="tx1"/>
                 </a:solidFill>
@@ -8702,7 +9347,7 @@
           <a:p>
             <a:pPr lvl="1"/>
             <a:r>
-              <a:rPr lang="nl-BE" dirty="0" smtClean="0">
+              <a:rPr lang="nl-BE" sz="2000" dirty="0" smtClean="0">
                 <a:solidFill>
                   <a:schemeClr val="tx1"/>
                 </a:solidFill>
@@ -8713,7 +9358,7 @@
           <a:p>
             <a:pPr lvl="1"/>
             <a:r>
-              <a:rPr lang="nl-BE" dirty="0" smtClean="0">
+              <a:rPr lang="nl-BE" sz="2000" dirty="0" smtClean="0">
                 <a:solidFill>
                   <a:schemeClr val="tx1"/>
                 </a:solidFill>
@@ -8771,6 +9416,29 @@
           </a:extLst>
         </p:spPr>
       </p:pic>
+      <p:sp>
+        <p:nvSpPr>
+          <p:cNvPr id="7" name="Slide Number Placeholder 6"/>
+          <p:cNvSpPr>
+            <a:spLocks noGrp="1"/>
+          </p:cNvSpPr>
+          <p:nvPr>
+            <p:ph type="sldNum" sz="quarter" idx="12"/>
+          </p:nvPr>
+        </p:nvSpPr>
+        <p:spPr/>
+        <p:txBody>
+          <a:bodyPr/>
+          <a:lstStyle/>
+          <a:p>
+            <a:fld id="{E8DE238E-16BA-439B-8635-94B95965949D}" type="slidenum">
+              <a:rPr lang="nl-BE" smtClean="0"/>
+              <a:t>3</a:t>
+            </a:fld>
+            <a:endParaRPr lang="nl-BE" dirty="0"/>
+          </a:p>
+        </p:txBody>
+      </p:sp>
     </p:spTree>
     <p:extLst>
       <p:ext uri="{BB962C8B-B14F-4D97-AF65-F5344CB8AC3E}">
@@ -8901,6 +9569,29 @@
           </a:extLst>
         </p:spPr>
       </p:pic>
+      <p:sp>
+        <p:nvSpPr>
+          <p:cNvPr id="5" name="Slide Number Placeholder 4"/>
+          <p:cNvSpPr>
+            <a:spLocks noGrp="1"/>
+          </p:cNvSpPr>
+          <p:nvPr>
+            <p:ph type="sldNum" sz="quarter" idx="12"/>
+          </p:nvPr>
+        </p:nvSpPr>
+        <p:spPr/>
+        <p:txBody>
+          <a:bodyPr/>
+          <a:lstStyle/>
+          <a:p>
+            <a:fld id="{E8DE238E-16BA-439B-8635-94B95965949D}" type="slidenum">
+              <a:rPr lang="nl-BE" smtClean="0"/>
+              <a:t>4</a:t>
+            </a:fld>
+            <a:endParaRPr lang="nl-BE" dirty="0"/>
+          </a:p>
+        </p:txBody>
+      </p:sp>
     </p:spTree>
     <p:extLst>
       <p:ext uri="{BB962C8B-B14F-4D97-AF65-F5344CB8AC3E}">
@@ -8961,35 +9652,6 @@
           </a:p>
         </p:txBody>
       </p:sp>
-      <p:pic>
-        <p:nvPicPr>
-          <p:cNvPr id="4" name="Content Placeholder 3"/>
-          <p:cNvPicPr>
-            <a:picLocks noGrp="1" noChangeAspect="1"/>
-          </p:cNvPicPr>
-          <p:nvPr>
-            <p:ph idx="1"/>
-          </p:nvPr>
-        </p:nvPicPr>
-        <p:blipFill>
-          <a:blip r:embed="rId3">
-            <a:extLst>
-              <a:ext uri="{28A0092B-C50C-407E-A947-70E740481C1C}">
-                <a14:useLocalDpi xmlns:a14="http://schemas.microsoft.com/office/drawing/2010/main" val="0"/>
-              </a:ext>
-            </a:extLst>
-          </a:blip>
-          <a:stretch>
-            <a:fillRect/>
-          </a:stretch>
-        </p:blipFill>
-        <p:spPr>
-          <a:xfrm>
-            <a:off x="608899" y="2123271"/>
-            <a:ext cx="6348413" cy="3219471"/>
-          </a:xfrm>
-        </p:spPr>
-      </p:pic>
       <p:cxnSp>
         <p:nvCxnSpPr>
           <p:cNvPr id="7" name="Straight Arrow Connector 6"/>
@@ -8998,7 +9660,7 @@
         </p:nvCxnSpPr>
         <p:spPr>
           <a:xfrm flipV="1">
-            <a:off x="304800" y="2123271"/>
+            <a:off x="730469" y="2102226"/>
             <a:ext cx="0" cy="3219472"/>
           </a:xfrm>
           <a:prstGeom prst="straightConnector1">
@@ -9031,7 +9693,7 @@
         </p:nvSpPr>
         <p:spPr>
           <a:xfrm rot="16200000">
-            <a:off x="-273157" y="3594506"/>
+            <a:off x="152512" y="3573461"/>
             <a:ext cx="906017" cy="276999"/>
           </a:xfrm>
           <a:prstGeom prst="rect">
@@ -9061,8 +9723,8 @@
         </p:nvCxnSpPr>
         <p:spPr>
           <a:xfrm>
-            <a:off x="608899" y="5689600"/>
-            <a:ext cx="6348413" cy="0"/>
+            <a:off x="1034568" y="5668555"/>
+            <a:ext cx="5602715" cy="0"/>
           </a:xfrm>
           <a:prstGeom prst="straightConnector1">
             <a:avLst/>
@@ -9094,7 +9756,7 @@
         </p:nvSpPr>
         <p:spPr>
           <a:xfrm>
-            <a:off x="3568142" y="5412601"/>
+            <a:off x="3993811" y="5391556"/>
             <a:ext cx="429926" cy="276999"/>
           </a:xfrm>
           <a:prstGeom prst="rect">
@@ -9125,7 +9787,7 @@
           <p:nvPr/>
         </p:nvPicPr>
         <p:blipFill>
-          <a:blip r:embed="rId4" cstate="print">
+          <a:blip r:embed="rId3" cstate="print">
             <a:extLst>
               <a:ext uri="{28A0092B-C50C-407E-A947-70E740481C1C}">
                 <a14:useLocalDpi xmlns:a14="http://schemas.microsoft.com/office/drawing/2010/main" val="0"/>
@@ -9157,6 +9819,59 @@
           </a:extLst>
         </p:spPr>
       </p:pic>
+      <p:pic>
+        <p:nvPicPr>
+          <p:cNvPr id="3" name="Picture 2"/>
+          <p:cNvPicPr>
+            <a:picLocks noChangeAspect="1"/>
+          </p:cNvPicPr>
+          <p:nvPr/>
+        </p:nvPicPr>
+        <p:blipFill>
+          <a:blip r:embed="rId4">
+            <a:extLst>
+              <a:ext uri="{28A0092B-C50C-407E-A947-70E740481C1C}">
+                <a14:useLocalDpi xmlns:a14="http://schemas.microsoft.com/office/drawing/2010/main" val="0"/>
+              </a:ext>
+            </a:extLst>
+          </a:blip>
+          <a:stretch>
+            <a:fillRect/>
+          </a:stretch>
+        </p:blipFill>
+        <p:spPr>
+          <a:xfrm>
+            <a:off x="999250" y="2337281"/>
+            <a:ext cx="5417316" cy="3054273"/>
+          </a:xfrm>
+          <a:prstGeom prst="rect">
+            <a:avLst/>
+          </a:prstGeom>
+        </p:spPr>
+      </p:pic>
+      <p:sp>
+        <p:nvSpPr>
+          <p:cNvPr id="6" name="Slide Number Placeholder 5"/>
+          <p:cNvSpPr>
+            <a:spLocks noGrp="1"/>
+          </p:cNvSpPr>
+          <p:nvPr>
+            <p:ph type="sldNum" sz="quarter" idx="12"/>
+          </p:nvPr>
+        </p:nvSpPr>
+        <p:spPr/>
+        <p:txBody>
+          <a:bodyPr/>
+          <a:lstStyle/>
+          <a:p>
+            <a:fld id="{E8DE238E-16BA-439B-8635-94B95965949D}" type="slidenum">
+              <a:rPr lang="nl-BE" smtClean="0"/>
+              <a:t>5</a:t>
+            </a:fld>
+            <a:endParaRPr lang="nl-BE" dirty="0"/>
+          </a:p>
+        </p:txBody>
+      </p:sp>
     </p:spTree>
     <p:extLst>
       <p:ext uri="{BB962C8B-B14F-4D97-AF65-F5344CB8AC3E}">
@@ -9219,72 +9934,54 @@
       </p:sp>
       <p:pic>
         <p:nvPicPr>
-          <p:cNvPr id="4" name="Content Placeholder 3"/>
+          <p:cNvPr id="14" name="Picture 2" descr="http://www.renew.ugent.be/sites/default/files/LogoUGentWit.png"/>
           <p:cNvPicPr>
-            <a:picLocks noGrp="1" noChangeAspect="1"/>
+            <a:picLocks noChangeAspect="1" noChangeArrowheads="1"/>
           </p:cNvPicPr>
-          <p:nvPr>
-            <p:ph idx="1"/>
-          </p:nvPr>
+          <p:nvPr/>
         </p:nvPicPr>
         <p:blipFill>
-          <a:blip r:embed="rId3">
+          <a:blip r:embed="rId3" cstate="print">
             <a:extLst>
               <a:ext uri="{28A0092B-C50C-407E-A947-70E740481C1C}">
                 <a14:useLocalDpi xmlns:a14="http://schemas.microsoft.com/office/drawing/2010/main" val="0"/>
               </a:ext>
             </a:extLst>
           </a:blip>
+          <a:srcRect/>
           <a:stretch>
             <a:fillRect/>
           </a:stretch>
         </p:blipFill>
-        <p:spPr>
+        <p:spPr bwMode="auto">
           <a:xfrm>
-            <a:off x="608899" y="2123271"/>
-            <a:ext cx="6348413" cy="3219471"/>
-          </a:xfrm>
-        </p:spPr>
-      </p:pic>
-      <p:pic>
-        <p:nvPicPr>
-          <p:cNvPr id="5" name="Picture 4"/>
-          <p:cNvPicPr>
-            <a:picLocks noChangeAspect="1"/>
-          </p:cNvPicPr>
-          <p:nvPr/>
-        </p:nvPicPr>
-        <p:blipFill>
-          <a:blip r:embed="rId4">
-            <a:extLst>
-              <a:ext uri="{28A0092B-C50C-407E-A947-70E740481C1C}">
-                <a14:useLocalDpi xmlns:a14="http://schemas.microsoft.com/office/drawing/2010/main" val="0"/>
-              </a:ext>
-            </a:extLst>
-          </a:blip>
-          <a:stretch>
-            <a:fillRect/>
-          </a:stretch>
-        </p:blipFill>
-        <p:spPr>
-          <a:xfrm>
-            <a:off x="608899" y="2123270"/>
-            <a:ext cx="6348413" cy="3219472"/>
+            <a:off x="7623633" y="5668555"/>
+            <a:ext cx="1263564" cy="895025"/>
           </a:xfrm>
           <a:prstGeom prst="rect">
             <a:avLst/>
           </a:prstGeom>
+          <a:noFill/>
+          <a:extLst>
+            <a:ext uri="{909E8E84-426E-40DD-AFC4-6F175D3DCCD1}">
+              <a14:hiddenFill xmlns:a14="http://schemas.microsoft.com/office/drawing/2010/main">
+                <a:solidFill>
+                  <a:srgbClr val="FFFFFF"/>
+                </a:solidFill>
+              </a14:hiddenFill>
+            </a:ext>
+          </a:extLst>
         </p:spPr>
       </p:pic>
       <p:cxnSp>
         <p:nvCxnSpPr>
-          <p:cNvPr id="6" name="Straight Arrow Connector 5"/>
+          <p:cNvPr id="11" name="Straight Arrow Connector 10"/>
           <p:cNvCxnSpPr/>
           <p:nvPr/>
         </p:nvCxnSpPr>
         <p:spPr>
           <a:xfrm flipV="1">
-            <a:off x="304800" y="2123271"/>
+            <a:off x="730469" y="2102226"/>
             <a:ext cx="0" cy="3219472"/>
           </a:xfrm>
           <a:prstGeom prst="straightConnector1">
@@ -9311,13 +10008,13 @@
       </p:cxnSp>
       <p:sp>
         <p:nvSpPr>
-          <p:cNvPr id="7" name="TextBox 6"/>
+          <p:cNvPr id="12" name="TextBox 11"/>
           <p:cNvSpPr txBox="1"/>
           <p:nvPr/>
         </p:nvSpPr>
         <p:spPr>
           <a:xfrm rot="16200000">
-            <a:off x="-273157" y="3594506"/>
+            <a:off x="152512" y="3573461"/>
             <a:ext cx="906017" cy="276999"/>
           </a:xfrm>
           <a:prstGeom prst="rect">
@@ -9341,14 +10038,14 @@
       </p:sp>
       <p:cxnSp>
         <p:nvCxnSpPr>
-          <p:cNvPr id="8" name="Straight Arrow Connector 7"/>
+          <p:cNvPr id="13" name="Straight Arrow Connector 12"/>
           <p:cNvCxnSpPr/>
           <p:nvPr/>
         </p:nvCxnSpPr>
         <p:spPr>
           <a:xfrm>
-            <a:off x="608899" y="5689600"/>
-            <a:ext cx="6348413" cy="0"/>
+            <a:off x="1034568" y="5668555"/>
+            <a:ext cx="5602715" cy="0"/>
           </a:xfrm>
           <a:prstGeom prst="straightConnector1">
             <a:avLst/>
@@ -9374,13 +10071,13 @@
       </p:cxnSp>
       <p:sp>
         <p:nvSpPr>
-          <p:cNvPr id="9" name="TextBox 8"/>
+          <p:cNvPr id="15" name="TextBox 14"/>
           <p:cNvSpPr txBox="1"/>
           <p:nvPr/>
         </p:nvSpPr>
         <p:spPr>
           <a:xfrm>
-            <a:off x="3568142" y="5412601"/>
+            <a:off x="3993811" y="5391556"/>
             <a:ext cx="429926" cy="276999"/>
           </a:xfrm>
           <a:prstGeom prst="rect">
@@ -9404,45 +10101,87 @@
       </p:sp>
       <p:pic>
         <p:nvPicPr>
-          <p:cNvPr id="14" name="Picture 2" descr="http://www.renew.ugent.be/sites/default/files/LogoUGentWit.png"/>
+          <p:cNvPr id="16" name="Picture 15"/>
           <p:cNvPicPr>
-            <a:picLocks noChangeAspect="1" noChangeArrowheads="1"/>
+            <a:picLocks noChangeAspect="1"/>
           </p:cNvPicPr>
           <p:nvPr/>
         </p:nvPicPr>
         <p:blipFill>
-          <a:blip r:embed="rId5" cstate="print">
+          <a:blip r:embed="rId4">
             <a:extLst>
               <a:ext uri="{28A0092B-C50C-407E-A947-70E740481C1C}">
                 <a14:useLocalDpi xmlns:a14="http://schemas.microsoft.com/office/drawing/2010/main" val="0"/>
               </a:ext>
             </a:extLst>
           </a:blip>
-          <a:srcRect/>
           <a:stretch>
             <a:fillRect/>
           </a:stretch>
         </p:blipFill>
-        <p:spPr bwMode="auto">
+        <p:spPr>
           <a:xfrm>
-            <a:off x="7623633" y="5668555"/>
-            <a:ext cx="1263564" cy="895025"/>
+            <a:off x="999250" y="2337281"/>
+            <a:ext cx="5417316" cy="3054273"/>
           </a:xfrm>
           <a:prstGeom prst="rect">
             <a:avLst/>
           </a:prstGeom>
-          <a:noFill/>
-          <a:extLst>
-            <a:ext uri="{909E8E84-426E-40DD-AFC4-6F175D3DCCD1}">
-              <a14:hiddenFill xmlns:a14="http://schemas.microsoft.com/office/drawing/2010/main">
-                <a:solidFill>
-                  <a:srgbClr val="FFFFFF"/>
-                </a:solidFill>
-              </a14:hiddenFill>
-            </a:ext>
-          </a:extLst>
         </p:spPr>
       </p:pic>
+      <p:pic>
+        <p:nvPicPr>
+          <p:cNvPr id="18" name="Picture 17"/>
+          <p:cNvPicPr>
+            <a:picLocks noChangeAspect="1"/>
+          </p:cNvPicPr>
+          <p:nvPr/>
+        </p:nvPicPr>
+        <p:blipFill>
+          <a:blip r:embed="rId5">
+            <a:extLst>
+              <a:ext uri="{28A0092B-C50C-407E-A947-70E740481C1C}">
+                <a14:useLocalDpi xmlns:a14="http://schemas.microsoft.com/office/drawing/2010/main" val="0"/>
+              </a:ext>
+            </a:extLst>
+          </a:blip>
+          <a:stretch>
+            <a:fillRect/>
+          </a:stretch>
+        </p:blipFill>
+        <p:spPr>
+          <a:xfrm>
+            <a:off x="994713" y="2337278"/>
+            <a:ext cx="5417319" cy="3054275"/>
+          </a:xfrm>
+          <a:prstGeom prst="rect">
+            <a:avLst/>
+          </a:prstGeom>
+        </p:spPr>
+      </p:pic>
+      <p:sp>
+        <p:nvSpPr>
+          <p:cNvPr id="5" name="Slide Number Placeholder 4"/>
+          <p:cNvSpPr>
+            <a:spLocks noGrp="1"/>
+          </p:cNvSpPr>
+          <p:nvPr>
+            <p:ph type="sldNum" sz="quarter" idx="12"/>
+          </p:nvPr>
+        </p:nvSpPr>
+        <p:spPr/>
+        <p:txBody>
+          <a:bodyPr/>
+          <a:lstStyle/>
+          <a:p>
+            <a:fld id="{E8DE238E-16BA-439B-8635-94B95965949D}" type="slidenum">
+              <a:rPr lang="nl-BE" smtClean="0"/>
+              <a:t>6</a:t>
+            </a:fld>
+            <a:endParaRPr lang="nl-BE" dirty="0"/>
+          </a:p>
+        </p:txBody>
+      </p:sp>
     </p:spTree>
     <p:extLst>
       <p:ext uri="{BB962C8B-B14F-4D97-AF65-F5344CB8AC3E}">
@@ -9505,72 +10244,54 @@
       </p:sp>
       <p:pic>
         <p:nvPicPr>
-          <p:cNvPr id="4" name="Content Placeholder 3"/>
+          <p:cNvPr id="11" name="Picture 2" descr="http://www.renew.ugent.be/sites/default/files/LogoUGentWit.png"/>
           <p:cNvPicPr>
-            <a:picLocks noGrp="1" noChangeAspect="1"/>
+            <a:picLocks noChangeAspect="1" noChangeArrowheads="1"/>
           </p:cNvPicPr>
-          <p:nvPr>
-            <p:ph idx="1"/>
-          </p:nvPr>
+          <p:nvPr/>
         </p:nvPicPr>
         <p:blipFill>
-          <a:blip r:embed="rId3">
+          <a:blip r:embed="rId3" cstate="print">
             <a:extLst>
               <a:ext uri="{28A0092B-C50C-407E-A947-70E740481C1C}">
                 <a14:useLocalDpi xmlns:a14="http://schemas.microsoft.com/office/drawing/2010/main" val="0"/>
               </a:ext>
             </a:extLst>
           </a:blip>
+          <a:srcRect/>
           <a:stretch>
             <a:fillRect/>
           </a:stretch>
         </p:blipFill>
-        <p:spPr>
+        <p:spPr bwMode="auto">
           <a:xfrm>
-            <a:off x="608899" y="2123271"/>
-            <a:ext cx="6348413" cy="3219471"/>
-          </a:xfrm>
-        </p:spPr>
-      </p:pic>
-      <p:pic>
-        <p:nvPicPr>
-          <p:cNvPr id="5" name="Picture 4"/>
-          <p:cNvPicPr>
-            <a:picLocks noChangeAspect="1"/>
-          </p:cNvPicPr>
-          <p:nvPr/>
-        </p:nvPicPr>
-        <p:blipFill>
-          <a:blip r:embed="rId4">
-            <a:extLst>
-              <a:ext uri="{28A0092B-C50C-407E-A947-70E740481C1C}">
-                <a14:useLocalDpi xmlns:a14="http://schemas.microsoft.com/office/drawing/2010/main" val="0"/>
-              </a:ext>
-            </a:extLst>
-          </a:blip>
-          <a:stretch>
-            <a:fillRect/>
-          </a:stretch>
-        </p:blipFill>
-        <p:spPr>
-          <a:xfrm>
-            <a:off x="608899" y="2123270"/>
-            <a:ext cx="6348413" cy="3219472"/>
+            <a:off x="7623633" y="5668555"/>
+            <a:ext cx="1263564" cy="895025"/>
           </a:xfrm>
           <a:prstGeom prst="rect">
             <a:avLst/>
           </a:prstGeom>
+          <a:noFill/>
+          <a:extLst>
+            <a:ext uri="{909E8E84-426E-40DD-AFC4-6F175D3DCCD1}">
+              <a14:hiddenFill xmlns:a14="http://schemas.microsoft.com/office/drawing/2010/main">
+                <a:solidFill>
+                  <a:srgbClr val="FFFFFF"/>
+                </a:solidFill>
+              </a14:hiddenFill>
+            </a:ext>
+          </a:extLst>
         </p:spPr>
       </p:pic>
       <p:cxnSp>
         <p:nvCxnSpPr>
-          <p:cNvPr id="6" name="Straight Arrow Connector 5"/>
+          <p:cNvPr id="12" name="Straight Arrow Connector 11"/>
           <p:cNvCxnSpPr/>
           <p:nvPr/>
         </p:nvCxnSpPr>
         <p:spPr>
           <a:xfrm flipV="1">
-            <a:off x="304800" y="2123271"/>
+            <a:off x="730469" y="2102226"/>
             <a:ext cx="0" cy="3219472"/>
           </a:xfrm>
           <a:prstGeom prst="straightConnector1">
@@ -9597,13 +10318,13 @@
       </p:cxnSp>
       <p:sp>
         <p:nvSpPr>
-          <p:cNvPr id="7" name="TextBox 6"/>
+          <p:cNvPr id="13" name="TextBox 12"/>
           <p:cNvSpPr txBox="1"/>
           <p:nvPr/>
         </p:nvSpPr>
         <p:spPr>
           <a:xfrm rot="16200000">
-            <a:off x="-273157" y="3594506"/>
+            <a:off x="152512" y="3573461"/>
             <a:ext cx="906017" cy="276999"/>
           </a:xfrm>
           <a:prstGeom prst="rect">
@@ -9627,14 +10348,14 @@
       </p:sp>
       <p:cxnSp>
         <p:nvCxnSpPr>
-          <p:cNvPr id="8" name="Straight Arrow Connector 7"/>
+          <p:cNvPr id="14" name="Straight Arrow Connector 13"/>
           <p:cNvCxnSpPr/>
           <p:nvPr/>
         </p:nvCxnSpPr>
         <p:spPr>
           <a:xfrm>
-            <a:off x="608899" y="5689600"/>
-            <a:ext cx="6348413" cy="0"/>
+            <a:off x="1034568" y="5668555"/>
+            <a:ext cx="5602715" cy="0"/>
           </a:xfrm>
           <a:prstGeom prst="straightConnector1">
             <a:avLst/>
@@ -9660,13 +10381,13 @@
       </p:cxnSp>
       <p:sp>
         <p:nvSpPr>
-          <p:cNvPr id="9" name="TextBox 8"/>
+          <p:cNvPr id="15" name="TextBox 14"/>
           <p:cNvSpPr txBox="1"/>
           <p:nvPr/>
         </p:nvSpPr>
         <p:spPr>
           <a:xfrm>
-            <a:off x="3568142" y="5412601"/>
+            <a:off x="3993811" y="5391556"/>
             <a:ext cx="429926" cy="276999"/>
           </a:xfrm>
           <a:prstGeom prst="rect">
@@ -9690,7 +10411,37 @@
       </p:sp>
       <p:pic>
         <p:nvPicPr>
-          <p:cNvPr id="3" name="Picture 2"/>
+          <p:cNvPr id="16" name="Picture 15"/>
+          <p:cNvPicPr>
+            <a:picLocks noChangeAspect="1"/>
+          </p:cNvPicPr>
+          <p:nvPr/>
+        </p:nvPicPr>
+        <p:blipFill>
+          <a:blip r:embed="rId4">
+            <a:extLst>
+              <a:ext uri="{28A0092B-C50C-407E-A947-70E740481C1C}">
+                <a14:useLocalDpi xmlns:a14="http://schemas.microsoft.com/office/drawing/2010/main" val="0"/>
+              </a:ext>
+            </a:extLst>
+          </a:blip>
+          <a:stretch>
+            <a:fillRect/>
+          </a:stretch>
+        </p:blipFill>
+        <p:spPr>
+          <a:xfrm>
+            <a:off x="999250" y="2337281"/>
+            <a:ext cx="5417316" cy="3054273"/>
+          </a:xfrm>
+          <a:prstGeom prst="rect">
+            <a:avLst/>
+          </a:prstGeom>
+        </p:spPr>
+      </p:pic>
+      <p:pic>
+        <p:nvPicPr>
+          <p:cNvPr id="17" name="Picture 16"/>
           <p:cNvPicPr>
             <a:picLocks noChangeAspect="1"/>
           </p:cNvPicPr>
@@ -9710,55 +10461,37 @@
         </p:blipFill>
         <p:spPr>
           <a:xfrm>
-            <a:off x="608899" y="2123269"/>
-            <a:ext cx="6348416" cy="3219473"/>
+            <a:off x="999250" y="2337279"/>
+            <a:ext cx="5417316" cy="3054273"/>
           </a:xfrm>
           <a:prstGeom prst="rect">
             <a:avLst/>
           </a:prstGeom>
         </p:spPr>
       </p:pic>
-      <p:pic>
-        <p:nvPicPr>
-          <p:cNvPr id="11" name="Picture 2" descr="http://www.renew.ugent.be/sites/default/files/LogoUGentWit.png"/>
-          <p:cNvPicPr>
-            <a:picLocks noChangeAspect="1" noChangeArrowheads="1"/>
-          </p:cNvPicPr>
-          <p:nvPr/>
-        </p:nvPicPr>
-        <p:blipFill>
-          <a:blip r:embed="rId6" cstate="print">
-            <a:extLst>
-              <a:ext uri="{28A0092B-C50C-407E-A947-70E740481C1C}">
-                <a14:useLocalDpi xmlns:a14="http://schemas.microsoft.com/office/drawing/2010/main" val="0"/>
-              </a:ext>
-            </a:extLst>
-          </a:blip>
-          <a:srcRect/>
-          <a:stretch>
-            <a:fillRect/>
-          </a:stretch>
-        </p:blipFill>
-        <p:spPr bwMode="auto">
-          <a:xfrm>
-            <a:off x="7623633" y="5668555"/>
-            <a:ext cx="1263564" cy="895025"/>
-          </a:xfrm>
-          <a:prstGeom prst="rect">
-            <a:avLst/>
-          </a:prstGeom>
-          <a:noFill/>
-          <a:extLst>
-            <a:ext uri="{909E8E84-426E-40DD-AFC4-6F175D3DCCD1}">
-              <a14:hiddenFill xmlns:a14="http://schemas.microsoft.com/office/drawing/2010/main">
-                <a:solidFill>
-                  <a:srgbClr val="FFFFFF"/>
-                </a:solidFill>
-              </a14:hiddenFill>
-            </a:ext>
-          </a:extLst>
-        </p:spPr>
-      </p:pic>
+      <p:sp>
+        <p:nvSpPr>
+          <p:cNvPr id="5" name="Slide Number Placeholder 4"/>
+          <p:cNvSpPr>
+            <a:spLocks noGrp="1"/>
+          </p:cNvSpPr>
+          <p:nvPr>
+            <p:ph type="sldNum" sz="quarter" idx="12"/>
+          </p:nvPr>
+        </p:nvSpPr>
+        <p:spPr/>
+        <p:txBody>
+          <a:bodyPr/>
+          <a:lstStyle/>
+          <a:p>
+            <a:fld id="{E8DE238E-16BA-439B-8635-94B95965949D}" type="slidenum">
+              <a:rPr lang="nl-BE" smtClean="0"/>
+              <a:t>7</a:t>
+            </a:fld>
+            <a:endParaRPr lang="nl-BE" dirty="0"/>
+          </a:p>
+        </p:txBody>
+      </p:sp>
     </p:spTree>
     <p:extLst>
       <p:ext uri="{BB962C8B-B14F-4D97-AF65-F5344CB8AC3E}">
@@ -9829,13 +10562,20 @@
             <p:ph idx="1"/>
           </p:nvPr>
         </p:nvSpPr>
-        <p:spPr/>
-        <p:txBody>
-          <a:bodyPr/>
-          <a:lstStyle/>
-          <a:p>
-            <a:r>
-              <a:rPr lang="nl-BE" dirty="0" smtClean="0">
+        <p:spPr>
+          <a:xfrm>
+            <a:off x="609598" y="2160590"/>
+            <a:ext cx="6784185" cy="3880773"/>
+          </a:xfrm>
+        </p:spPr>
+        <p:txBody>
+          <a:bodyPr>
+            <a:normAutofit/>
+          </a:bodyPr>
+          <a:lstStyle/>
+          <a:p>
+            <a:r>
+              <a:rPr lang="nl-BE" sz="2000" dirty="0" smtClean="0">
                 <a:solidFill>
                   <a:schemeClr val="tx1"/>
                 </a:solidFill>
@@ -9843,7 +10583,7 @@
               <a:t>IPEM: onderzoek </a:t>
             </a:r>
             <a:r>
-              <a:rPr lang="nl-BE" dirty="0">
+              <a:rPr lang="nl-BE" sz="2000" dirty="0">
                 <a:solidFill>
                   <a:schemeClr val="tx1"/>
                 </a:solidFill>
@@ -9851,7 +10591,7 @@
               <a:t>naar </a:t>
             </a:r>
             <a:r>
-              <a:rPr lang="nl-BE" b="1" dirty="0">
+              <a:rPr lang="nl-BE" sz="2000" b="1" dirty="0">
                 <a:solidFill>
                   <a:schemeClr val="tx1"/>
                 </a:solidFill>
@@ -9859,7 +10599,7 @@
               <a:t>musicologie / </a:t>
             </a:r>
             <a:r>
-              <a:rPr lang="nl-BE" b="1" dirty="0" smtClean="0">
+              <a:rPr lang="nl-BE" sz="2000" b="1" dirty="0" smtClean="0">
                 <a:solidFill>
                   <a:schemeClr val="tx1"/>
                 </a:solidFill>
@@ -9869,7 +10609,7 @@
           </a:p>
           <a:p>
             <a:r>
-              <a:rPr lang="nl-BE" dirty="0" smtClean="0">
+              <a:rPr lang="nl-BE" sz="2000" dirty="0" smtClean="0">
                 <a:solidFill>
                   <a:schemeClr val="tx1"/>
                 </a:solidFill>
@@ -9880,7 +10620,7 @@
           <a:p>
             <a:pPr lvl="1"/>
             <a:r>
-              <a:rPr lang="nl-BE" dirty="0" smtClean="0">
+              <a:rPr lang="nl-BE" sz="2000" dirty="0" smtClean="0">
                 <a:solidFill>
                   <a:schemeClr val="tx1"/>
                 </a:solidFill>
@@ -9891,7 +10631,7 @@
           <a:p>
             <a:pPr lvl="1"/>
             <a:r>
-              <a:rPr lang="nl-BE" dirty="0" smtClean="0">
+              <a:rPr lang="nl-BE" sz="2000" dirty="0" smtClean="0">
                 <a:solidFill>
                   <a:schemeClr val="tx1"/>
                 </a:solidFill>
@@ -9902,7 +10642,7 @@
           <a:p>
             <a:pPr lvl="1"/>
             <a:r>
-              <a:rPr lang="nl-BE" dirty="0" smtClean="0">
+              <a:rPr lang="nl-BE" sz="2000" dirty="0" smtClean="0">
                 <a:solidFill>
                   <a:schemeClr val="tx1"/>
                 </a:solidFill>
@@ -9913,14 +10653,14 @@
           <a:p>
             <a:pPr lvl="1"/>
             <a:r>
-              <a:rPr lang="nl-BE" dirty="0" smtClean="0">
+              <a:rPr lang="nl-BE" sz="2000" dirty="0" smtClean="0">
                 <a:solidFill>
                   <a:schemeClr val="tx1"/>
                 </a:solidFill>
               </a:rPr>
               <a:t>Synchronisatie is nodig</a:t>
             </a:r>
-            <a:endParaRPr lang="nl-BE" dirty="0">
+            <a:endParaRPr lang="nl-BE" sz="2000" dirty="0">
               <a:solidFill>
                 <a:schemeClr val="tx1"/>
               </a:solidFill>
@@ -9969,6 +10709,29 @@
           </a:extLst>
         </p:spPr>
       </p:pic>
+      <p:sp>
+        <p:nvSpPr>
+          <p:cNvPr id="7" name="Slide Number Placeholder 6"/>
+          <p:cNvSpPr>
+            <a:spLocks noGrp="1"/>
+          </p:cNvSpPr>
+          <p:nvPr>
+            <p:ph type="sldNum" sz="quarter" idx="12"/>
+          </p:nvPr>
+        </p:nvSpPr>
+        <p:spPr/>
+        <p:txBody>
+          <a:bodyPr/>
+          <a:lstStyle/>
+          <a:p>
+            <a:fld id="{E8DE238E-16BA-439B-8635-94B95965949D}" type="slidenum">
+              <a:rPr lang="nl-BE" smtClean="0"/>
+              <a:t>8</a:t>
+            </a:fld>
+            <a:endParaRPr lang="nl-BE" dirty="0"/>
+          </a:p>
+        </p:txBody>
+      </p:sp>
     </p:spTree>
     <p:extLst>
       <p:ext uri="{BB962C8B-B14F-4D97-AF65-F5344CB8AC3E}">
@@ -10041,38 +10804,98 @@
         </p:nvSpPr>
         <p:spPr/>
         <p:txBody>
-          <a:bodyPr/>
-          <a:lstStyle/>
-          <a:p>
-            <a:r>
-              <a:rPr lang="nl-BE" dirty="0" smtClean="0">
+          <a:bodyPr>
+            <a:normAutofit/>
+          </a:bodyPr>
+          <a:lstStyle/>
+          <a:p>
+            <a:r>
+              <a:rPr lang="nl-BE" sz="2000" dirty="0" smtClean="0">
                 <a:solidFill>
                   <a:schemeClr val="tx1"/>
                 </a:solidFill>
               </a:rPr>
-              <a:t>Elke sensor of video-opname: koppelen met synchrone audiostream.</a:t>
-            </a:r>
-          </a:p>
-          <a:p>
-            <a:r>
-              <a:rPr lang="nl-BE" dirty="0" smtClean="0">
+              <a:t>Elke sensor of video-opname: koppelen met synchrone audiostream</a:t>
+            </a:r>
+            <a:r>
+              <a:rPr lang="nl-BE" sz="2000" dirty="0" smtClean="0">
                 <a:solidFill>
                   <a:schemeClr val="tx1"/>
                 </a:solidFill>
               </a:rPr>
-              <a:t>Audiostream: opname van omgevingsgeluid</a:t>
-            </a:r>
-          </a:p>
-          <a:p>
-            <a:r>
-              <a:rPr lang="nl-BE" dirty="0" smtClean="0">
+              <a:t>.</a:t>
+            </a:r>
+          </a:p>
+          <a:p>
+            <a:r>
+              <a:rPr lang="nl-BE" sz="2000" dirty="0" smtClean="0">
+                <a:solidFill>
+                  <a:schemeClr val="tx1"/>
+                </a:solidFill>
+              </a:rPr>
+              <a:t>Audiostream</a:t>
+            </a:r>
+            <a:r>
+              <a:rPr lang="nl-BE" sz="2000" dirty="0" smtClean="0">
+                <a:solidFill>
+                  <a:schemeClr val="tx1"/>
+                </a:solidFill>
+              </a:rPr>
+              <a:t>: opname van </a:t>
+            </a:r>
+            <a:r>
+              <a:rPr lang="nl-BE" sz="2000" dirty="0" smtClean="0">
+                <a:solidFill>
+                  <a:schemeClr val="tx1"/>
+                </a:solidFill>
+              </a:rPr>
+              <a:t>omgevingsgeluid</a:t>
+            </a:r>
+          </a:p>
+          <a:p>
+            <a:r>
+              <a:rPr lang="nl-BE" sz="2000" dirty="0">
+                <a:solidFill>
+                  <a:schemeClr val="tx1"/>
+                </a:solidFill>
+              </a:rPr>
+              <a:t>Microfoon “dicht” bij sensor =&gt; zelfde latency</a:t>
+            </a:r>
+          </a:p>
+          <a:p>
+            <a:pPr lvl="1"/>
+            <a:r>
+              <a:rPr lang="nl-BE" sz="1800" dirty="0">
+                <a:solidFill>
+                  <a:schemeClr val="tx1"/>
+                </a:solidFill>
+              </a:rPr>
+              <a:t>Zelfde hardware (microcontroller</a:t>
+            </a:r>
+            <a:r>
+              <a:rPr lang="nl-BE" sz="1800" dirty="0" smtClean="0">
+                <a:solidFill>
+                  <a:schemeClr val="tx1"/>
+                </a:solidFill>
+              </a:rPr>
+              <a:t>)</a:t>
+            </a:r>
+            <a:endParaRPr lang="nl-BE" sz="2000" dirty="0" smtClean="0">
+              <a:solidFill>
+                <a:schemeClr val="tx1"/>
+              </a:solidFill>
+            </a:endParaRPr>
+          </a:p>
+          <a:p>
+            <a:r>
+              <a:rPr lang="nl-BE" sz="2000" dirty="0" smtClean="0">
                 <a:solidFill>
                   <a:schemeClr val="tx1"/>
                 </a:solidFill>
               </a:rPr>
               <a:t>Synchronisatie datastreams = synchronisatie audiostreams.</a:t>
             </a:r>
-            <a:endParaRPr lang="nl-BE" dirty="0">
+            <a:endParaRPr lang="nl-BE" sz="2000" dirty="0">
               <a:solidFill>
                 <a:schemeClr val="tx1"/>
               </a:solidFill>
@@ -10121,6 +10944,29 @@
           </a:extLst>
         </p:spPr>
       </p:pic>
+      <p:sp>
+        <p:nvSpPr>
+          <p:cNvPr id="7" name="Slide Number Placeholder 6"/>
+          <p:cNvSpPr>
+            <a:spLocks noGrp="1"/>
+          </p:cNvSpPr>
+          <p:nvPr>
+            <p:ph type="sldNum" sz="quarter" idx="12"/>
+          </p:nvPr>
+        </p:nvSpPr>
+        <p:spPr/>
+        <p:txBody>
+          <a:bodyPr/>
+          <a:lstStyle/>
+          <a:p>
+            <a:fld id="{E8DE238E-16BA-439B-8635-94B95965949D}" type="slidenum">
+              <a:rPr lang="nl-BE" smtClean="0"/>
+              <a:t>9</a:t>
+            </a:fld>
+            <a:endParaRPr lang="nl-BE" dirty="0"/>
+          </a:p>
+        </p:txBody>
+      </p:sp>
     </p:spTree>
     <p:extLst>
       <p:ext uri="{BB962C8B-B14F-4D97-AF65-F5344CB8AC3E}">

</xml_diff>